<commit_message>
changes 10:30AM Thursday March 11th
</commit_message>
<xml_diff>
--- a/Presentation-projet-SQLite [Autosaved].pptx
+++ b/Presentation-projet-SQLite [Autosaved].pptx
@@ -5,10 +5,10 @@
     <p:sldMasterId id="2147483839" r:id="rId1"/>
   </p:sldMasterIdLst>
   <p:notesMasterIdLst>
-    <p:notesMasterId r:id="rId80"/>
+    <p:notesMasterId r:id="rId82"/>
   </p:notesMasterIdLst>
   <p:handoutMasterIdLst>
-    <p:handoutMasterId r:id="rId81"/>
+    <p:handoutMasterId r:id="rId83"/>
   </p:handoutMasterIdLst>
   <p:sldIdLst>
     <p:sldId id="257" r:id="rId2"/>
@@ -88,7 +88,9 @@
     <p:sldId id="262" r:id="rId76"/>
     <p:sldId id="277" r:id="rId77"/>
     <p:sldId id="339" r:id="rId78"/>
-    <p:sldId id="281" r:id="rId79"/>
+    <p:sldId id="349" r:id="rId79"/>
+    <p:sldId id="350" r:id="rId80"/>
+    <p:sldId id="281" r:id="rId81"/>
   </p:sldIdLst>
   <p:sldSz cx="12192000" cy="6858000"/>
   <p:notesSz cx="6858000" cy="9144000"/>
@@ -355,7 +357,7 @@
           <a:p>
             <a:fld id="{4BBBBF6B-ACDD-4A14-800E-2B828951F2E5}" type="slidenum">
               <a:rPr lang="fr-FR" smtClean="0"/>
-              <a:t>‹#›</a:t>
+              <a:t>‹N°›</a:t>
             </a:fld>
             <a:endParaRPr lang="fr-FR"/>
           </a:p>
@@ -614,7 +616,7 @@
           <a:p>
             <a:fld id="{F4625AEE-926E-49DB-B657-4E194F63E769}" type="slidenum">
               <a:rPr lang="fr-FR" smtClean="0"/>
-              <a:t>‹#›</a:t>
+              <a:t>‹N°›</a:t>
             </a:fld>
             <a:endParaRPr lang="fr-FR"/>
           </a:p>
@@ -896,7 +898,7 @@
             <a:fld id="{2376E620-B82E-4BB3-B55A-C1C511C62C08}" type="slidenum">
               <a:rPr lang="fr-FR" smtClean="0"/>
               <a:pPr/>
-              <a:t>‹#›</a:t>
+              <a:t>‹N°›</a:t>
             </a:fld>
             <a:endParaRPr lang="fr-FR" dirty="0"/>
           </a:p>
@@ -1065,7 +1067,7 @@
             <a:fld id="{2376E620-B82E-4BB3-B55A-C1C511C62C08}" type="slidenum">
               <a:rPr lang="fr-FR" smtClean="0"/>
               <a:pPr/>
-              <a:t>‹#›</a:t>
+              <a:t>‹N°›</a:t>
             </a:fld>
             <a:endParaRPr lang="fr-FR" dirty="0"/>
           </a:p>
@@ -1245,7 +1247,7 @@
             <a:fld id="{2376E620-B82E-4BB3-B55A-C1C511C62C08}" type="slidenum">
               <a:rPr lang="fr-FR" smtClean="0"/>
               <a:pPr/>
-              <a:t>‹#›</a:t>
+              <a:t>‹N°›</a:t>
             </a:fld>
             <a:endParaRPr lang="fr-FR" dirty="0"/>
           </a:p>
@@ -1415,7 +1417,7 @@
             <a:fld id="{2376E620-B82E-4BB3-B55A-C1C511C62C08}" type="slidenum">
               <a:rPr lang="fr-FR" smtClean="0"/>
               <a:pPr/>
-              <a:t>‹#›</a:t>
+              <a:t>‹N°›</a:t>
             </a:fld>
             <a:endParaRPr lang="fr-FR" dirty="0"/>
           </a:p>
@@ -1661,7 +1663,7 @@
           <a:p>
             <a:fld id="{2376E620-B82E-4BB3-B55A-C1C511C62C08}" type="slidenum">
               <a:rPr lang="fr-FR" smtClean="0"/>
-              <a:t>‹#›</a:t>
+              <a:t>‹N°›</a:t>
             </a:fld>
             <a:endParaRPr lang="fr-FR" dirty="0"/>
           </a:p>
@@ -1891,7 +1893,7 @@
             <a:fld id="{2376E620-B82E-4BB3-B55A-C1C511C62C08}" type="slidenum">
               <a:rPr lang="fr-FR" smtClean="0"/>
               <a:pPr/>
-              <a:t>‹#›</a:t>
+              <a:t>‹N°›</a:t>
             </a:fld>
             <a:endParaRPr lang="fr-FR" dirty="0"/>
           </a:p>
@@ -2257,7 +2259,7 @@
             <a:fld id="{2376E620-B82E-4BB3-B55A-C1C511C62C08}" type="slidenum">
               <a:rPr lang="fr-FR" smtClean="0"/>
               <a:pPr/>
-              <a:t>‹#›</a:t>
+              <a:t>‹N°›</a:t>
             </a:fld>
             <a:endParaRPr lang="fr-FR" dirty="0"/>
           </a:p>
@@ -2375,7 +2377,7 @@
           <a:p>
             <a:fld id="{2376E620-B82E-4BB3-B55A-C1C511C62C08}" type="slidenum">
               <a:rPr lang="fr-FR" smtClean="0"/>
-              <a:t>‹#›</a:t>
+              <a:t>‹N°›</a:t>
             </a:fld>
             <a:endParaRPr lang="fr-FR" dirty="0"/>
           </a:p>
@@ -2470,7 +2472,7 @@
           <a:p>
             <a:fld id="{2376E620-B82E-4BB3-B55A-C1C511C62C08}" type="slidenum">
               <a:rPr lang="fr-FR" smtClean="0"/>
-              <a:t>‹#›</a:t>
+              <a:t>‹N°›</a:t>
             </a:fld>
             <a:endParaRPr lang="fr-FR" dirty="0"/>
           </a:p>
@@ -2746,7 +2748,7 @@
             <a:fld id="{2376E620-B82E-4BB3-B55A-C1C511C62C08}" type="slidenum">
               <a:rPr lang="fr-FR" smtClean="0"/>
               <a:pPr/>
-              <a:t>‹#›</a:t>
+              <a:t>‹N°›</a:t>
             </a:fld>
             <a:endParaRPr lang="fr-FR" dirty="0"/>
           </a:p>
@@ -2999,7 +3001,7 @@
           <a:p>
             <a:fld id="{2376E620-B82E-4BB3-B55A-C1C511C62C08}" type="slidenum">
               <a:rPr lang="fr-FR" smtClean="0"/>
-              <a:t>‹#›</a:t>
+              <a:t>‹N°›</a:t>
             </a:fld>
             <a:endParaRPr lang="fr-FR"/>
           </a:p>
@@ -3247,7 +3249,7 @@
             <a:fld id="{2376E620-B82E-4BB3-B55A-C1C511C62C08}" type="slidenum">
               <a:rPr lang="fr-FR" smtClean="0"/>
               <a:pPr/>
-              <a:t>‹#›</a:t>
+              <a:t>‹N°›</a:t>
             </a:fld>
             <a:endParaRPr lang="fr-FR" dirty="0"/>
           </a:p>
@@ -3706,7 +3708,7 @@
               </a:rPr>
               <a:t>People's Democratic Republic of Algeria</a:t>
             </a:r>
-            <a:r>
+            <a:br>
               <a:rPr kumimoji="0" lang="fr-FR" sz="2000" b="0" i="0" u="none" strike="noStrike" kern="1200" cap="none" spc="0" normalizeH="0" baseline="0" noProof="0" dirty="0">
                 <a:ln>
                   <a:noFill/>
@@ -3721,23 +3723,6 @@
                 <a:ea typeface="Times New Roman"/>
                 <a:cs typeface="+mj-cs"/>
               </a:rPr>
-              <a:t/>
-            </a:r>
-            <a:br>
-              <a:rPr kumimoji="0" lang="fr-FR" sz="2000" b="0" i="0" u="none" strike="noStrike" kern="1200" cap="none" spc="0" normalizeH="0" baseline="0" noProof="0" dirty="0">
-                <a:ln>
-                  <a:noFill/>
-                </a:ln>
-                <a:solidFill>
-                  <a:prstClr val="black"/>
-                </a:solidFill>
-                <a:effectLst/>
-                <a:uLnTx/>
-                <a:uFillTx/>
-                <a:latin typeface="Times New Roman"/>
-                <a:ea typeface="Times New Roman"/>
-                <a:cs typeface="+mj-cs"/>
-              </a:rPr>
             </a:br>
             <a:r>
               <a:rPr kumimoji="0" lang="en-US" sz="2000" b="0" i="0" u="none" strike="noStrike" kern="1200" cap="none" spc="0" normalizeH="0" baseline="0" noProof="0" dirty="0">
@@ -3756,7 +3741,7 @@
               </a:rPr>
               <a:t>Ministry of Higher Education and Scientific Research</a:t>
             </a:r>
-            <a:r>
+            <a:br>
               <a:rPr kumimoji="0" lang="fr-FR" sz="2000" b="0" i="0" u="none" strike="noStrike" kern="1200" cap="none" spc="0" normalizeH="0" baseline="0" noProof="0" dirty="0">
                 <a:ln>
                   <a:noFill/>
@@ -3771,9 +3756,8 @@
                 <a:ea typeface="Calibri"/>
                 <a:cs typeface="Times New Roman"/>
               </a:rPr>
-              <a:t/>
-            </a:r>
-            <a:br>
+            </a:br>
+            <a:r>
               <a:rPr kumimoji="0" lang="fr-FR" sz="2000" b="0" i="0" u="none" strike="noStrike" kern="1200" cap="none" spc="0" normalizeH="0" baseline="0" noProof="0" dirty="0">
                 <a:ln>
                   <a:noFill/>
@@ -3788,9 +3772,10 @@
                 <a:ea typeface="Calibri"/>
                 <a:cs typeface="Times New Roman"/>
               </a:rPr>
-            </a:br>
-            <a:r>
-              <a:rPr kumimoji="0" lang="fr-FR" sz="2000" b="0" i="0" u="none" strike="noStrike" kern="1200" cap="none" spc="0" normalizeH="0" baseline="0" noProof="0" dirty="0">
+              <a:t>Ibn </a:t>
+            </a:r>
+            <a:r>
+              <a:rPr kumimoji="0" lang="fr-FR" sz="2000" b="0" i="0" u="none" strike="noStrike" kern="1200" cap="none" spc="0" normalizeH="0" baseline="0" noProof="0" dirty="0" err="1">
                 <a:ln>
                   <a:noFill/>
                 </a:ln>
@@ -3804,10 +3789,10 @@
                 <a:ea typeface="Calibri"/>
                 <a:cs typeface="Times New Roman"/>
               </a:rPr>
-              <a:t>Ibn </a:t>
-            </a:r>
-            <a:r>
-              <a:rPr kumimoji="0" lang="fr-FR" sz="2000" b="0" i="0" u="none" strike="noStrike" kern="1200" cap="none" spc="0" normalizeH="0" baseline="0" noProof="0" dirty="0" err="1">
+              <a:t>Khaldoun</a:t>
+            </a:r>
+            <a:r>
+              <a:rPr kumimoji="0" lang="fr-FR" sz="2000" b="0" i="0" u="none" strike="noStrike" kern="1200" cap="none" spc="0" normalizeH="0" baseline="0" noProof="0" dirty="0">
                 <a:ln>
                   <a:noFill/>
                 </a:ln>
@@ -3821,10 +3806,10 @@
                 <a:ea typeface="Calibri"/>
                 <a:cs typeface="Times New Roman"/>
               </a:rPr>
-              <a:t>Khaldoun</a:t>
-            </a:r>
-            <a:r>
-              <a:rPr kumimoji="0" lang="fr-FR" sz="2000" b="0" i="0" u="none" strike="noStrike" kern="1200" cap="none" spc="0" normalizeH="0" baseline="0" noProof="0" dirty="0">
+              <a:t> </a:t>
+            </a:r>
+            <a:r>
+              <a:rPr kumimoji="0" lang="fr-FR" sz="2000" b="0" i="0" u="none" strike="noStrike" kern="1200" cap="none" spc="0" normalizeH="0" baseline="0" noProof="0" dirty="0" err="1">
                 <a:ln>
                   <a:noFill/>
                 </a:ln>
@@ -3838,10 +3823,10 @@
                 <a:ea typeface="Calibri"/>
                 <a:cs typeface="Times New Roman"/>
               </a:rPr>
-              <a:t> </a:t>
-            </a:r>
-            <a:r>
-              <a:rPr kumimoji="0" lang="fr-FR" sz="2000" b="0" i="0" u="none" strike="noStrike" kern="1200" cap="none" spc="0" normalizeH="0" baseline="0" noProof="0" dirty="0" err="1">
+              <a:t>University</a:t>
+            </a:r>
+            <a:r>
+              <a:rPr kumimoji="0" lang="fr-FR" sz="2000" b="0" i="0" u="none" strike="noStrike" kern="1200" cap="none" spc="0" normalizeH="0" baseline="0" noProof="0" dirty="0">
                 <a:ln>
                   <a:noFill/>
                 </a:ln>
@@ -3855,9 +3840,9 @@
                 <a:ea typeface="Calibri"/>
                 <a:cs typeface="Times New Roman"/>
               </a:rPr>
-              <a:t>University</a:t>
-            </a:r>
-            <a:r>
+              <a:t> of Tiaret</a:t>
+            </a:r>
+            <a:br>
               <a:rPr kumimoji="0" lang="fr-FR" sz="2000" b="0" i="0" u="none" strike="noStrike" kern="1200" cap="none" spc="0" normalizeH="0" baseline="0" noProof="0" dirty="0">
                 <a:ln>
                   <a:noFill/>
@@ -3872,9 +3857,8 @@
                 <a:ea typeface="Calibri"/>
                 <a:cs typeface="Times New Roman"/>
               </a:rPr>
-              <a:t> of Tiaret</a:t>
-            </a:r>
-            <a:br>
+            </a:br>
+            <a:r>
               <a:rPr kumimoji="0" lang="fr-FR" sz="2000" b="0" i="0" u="none" strike="noStrike" kern="1200" cap="none" spc="0" normalizeH="0" baseline="0" noProof="0" dirty="0">
                 <a:ln>
                   <a:noFill/>
@@ -3889,9 +3873,10 @@
                 <a:ea typeface="Calibri"/>
                 <a:cs typeface="Times New Roman"/>
               </a:rPr>
-            </a:br>
-            <a:r>
-              <a:rPr kumimoji="0" lang="fr-FR" sz="2000" b="0" i="0" u="none" strike="noStrike" kern="1200" cap="none" spc="0" normalizeH="0" baseline="0" noProof="0" dirty="0">
+              <a:t>computer science </a:t>
+            </a:r>
+            <a:r>
+              <a:rPr kumimoji="0" lang="fr-FR" sz="2000" b="0" i="0" u="none" strike="noStrike" kern="1200" cap="none" spc="0" normalizeH="0" baseline="0" noProof="0" dirty="0" err="1">
                 <a:ln>
                   <a:noFill/>
                 </a:ln>
@@ -3905,10 +3890,10 @@
                 <a:ea typeface="Calibri"/>
                 <a:cs typeface="Times New Roman"/>
               </a:rPr>
-              <a:t>computer science </a:t>
-            </a:r>
-            <a:r>
-              <a:rPr kumimoji="0" lang="fr-FR" sz="2000" b="0" i="0" u="none" strike="noStrike" kern="1200" cap="none" spc="0" normalizeH="0" baseline="0" noProof="0" dirty="0" err="1">
+              <a:t>faculty</a:t>
+            </a:r>
+            <a:r>
+              <a:rPr kumimoji="0" lang="fr-FR" sz="2000" b="0" i="0" u="none" strike="noStrike" kern="1200" cap="none" spc="0" normalizeH="0" baseline="0" noProof="0" dirty="0">
                 <a:ln>
                   <a:noFill/>
                 </a:ln>
@@ -3922,10 +3907,10 @@
                 <a:ea typeface="Calibri"/>
                 <a:cs typeface="Times New Roman"/>
               </a:rPr>
-              <a:t>faculty</a:t>
-            </a:r>
-            <a:r>
-              <a:rPr kumimoji="0" lang="fr-FR" sz="2000" b="0" i="0" u="none" strike="noStrike" kern="1200" cap="none" spc="0" normalizeH="0" baseline="0" noProof="0" dirty="0">
+              <a:t> </a:t>
+            </a:r>
+            <a:r>
+              <a:rPr kumimoji="0" lang="fr-FR" sz="100" b="0" i="0" u="none" strike="noStrike" kern="1200" cap="none" spc="0" normalizeH="0" noProof="0" dirty="0">
                 <a:ln>
                   <a:noFill/>
                 </a:ln>
@@ -3942,34 +3927,17 @@
               <a:t> </a:t>
             </a:r>
             <a:r>
-              <a:rPr kumimoji="0" lang="fr-FR" sz="100" b="0" i="0" u="none" strike="noStrike" kern="1200" cap="none" spc="0" normalizeH="0" noProof="0" dirty="0">
-                <a:ln>
-                  <a:noFill/>
-                </a:ln>
+              <a:rPr lang="ja-JP" altLang="en-US" sz="100" dirty="0">
                 <a:solidFill>
                   <a:prstClr val="black"/>
                 </a:solidFill>
-                <a:effectLst/>
-                <a:uLnTx/>
-                <a:uFillTx/>
                 <a:latin typeface="Times New Roman"/>
                 <a:ea typeface="Calibri"/>
                 <a:cs typeface="Times New Roman"/>
               </a:rPr>
-              <a:t> </a:t>
-            </a:r>
-            <a:r>
-              <a:rPr lang="ja-JP" altLang="en-US" sz="100" dirty="0">
-                <a:solidFill>
-                  <a:prstClr val="black"/>
-                </a:solidFill>
-                <a:latin typeface="Times New Roman"/>
-                <a:ea typeface="Calibri"/>
-                <a:cs typeface="Times New Roman"/>
-              </a:rPr>
               <a:t>私たちはアルジェリア人です</a:t>
             </a:r>
-            <a:r>
+            <a:br>
               <a:rPr kumimoji="0" lang="fr-FR" sz="2000" b="1" i="0" u="none" strike="noStrike" kern="1200" cap="none" spc="0" normalizeH="0" baseline="0" noProof="0" dirty="0">
                 <a:ln>
                   <a:noFill/>
@@ -3984,41 +3952,7 @@
                 <a:ea typeface="+mj-ea"/>
                 <a:cs typeface="+mj-cs"/>
               </a:rPr>
-              <a:t/>
-            </a:r>
-            <a:br>
-              <a:rPr kumimoji="0" lang="fr-FR" sz="2000" b="1" i="0" u="none" strike="noStrike" kern="1200" cap="none" spc="0" normalizeH="0" baseline="0" noProof="0" dirty="0">
-                <a:ln>
-                  <a:noFill/>
-                </a:ln>
-                <a:solidFill>
-                  <a:srgbClr val="000000"/>
-                </a:solidFill>
-                <a:effectLst/>
-                <a:uLnTx/>
-                <a:uFillTx/>
-                <a:latin typeface="Constantia" pitchFamily="18" charset="0"/>
-                <a:ea typeface="+mj-ea"/>
-                <a:cs typeface="+mj-cs"/>
-              </a:rPr>
             </a:br>
-            <a:r>
-              <a:rPr kumimoji="0" lang="fr-FR" sz="2000" b="0" i="0" u="none" strike="noStrike" kern="1200" cap="none" spc="0" normalizeH="0" baseline="0" noProof="0" dirty="0">
-                <a:ln>
-                  <a:noFill/>
-                </a:ln>
-                <a:solidFill>
-                  <a:prstClr val="black"/>
-                </a:solidFill>
-                <a:effectLst/>
-                <a:uLnTx/>
-                <a:uFillTx/>
-                <a:latin typeface="Times New Roman"/>
-                <a:ea typeface="Times New Roman"/>
-                <a:cs typeface="+mj-cs"/>
-              </a:rPr>
-              <a:t/>
-            </a:r>
             <a:br>
               <a:rPr kumimoji="0" lang="fr-FR" sz="2000" b="0" i="0" u="none" strike="noStrike" kern="1200" cap="none" spc="0" normalizeH="0" baseline="0" noProof="0" dirty="0">
                 <a:ln>
@@ -4747,23 +4681,6 @@
               <a:tabLst/>
               <a:defRPr/>
             </a:pPr>
-            <a:r>
-              <a:rPr kumimoji="0" lang="fr-FR" sz="2400" b="0" i="0" u="none" strike="noStrike" kern="1200" cap="none" spc="0" normalizeH="0" baseline="0" noProof="0" dirty="0">
-                <a:ln>
-                  <a:noFill/>
-                </a:ln>
-                <a:solidFill>
-                  <a:prstClr val="black"/>
-                </a:solidFill>
-                <a:effectLst/>
-                <a:uLnTx/>
-                <a:uFillTx/>
-                <a:latin typeface="Calibri" panose="020F0502020204030204"/>
-                <a:ea typeface="+mn-ea"/>
-                <a:cs typeface="+mn-cs"/>
-              </a:rPr>
-              <a:t/>
-            </a:r>
             <a:br>
               <a:rPr kumimoji="0" lang="fr-FR" sz="2400" b="0" i="0" u="none" strike="noStrike" kern="1200" cap="none" spc="0" normalizeH="0" baseline="0" noProof="0" dirty="0">
                 <a:ln>
@@ -5090,10 +5007,6 @@
           <a:lstStyle/>
           <a:p>
             <a:pPr marL="12700" algn="ctr"/>
-            <a:r>
-              <a:rPr lang="fr-FR" sz="2400" dirty="0"/>
-              <a:t/>
-            </a:r>
             <a:br>
               <a:rPr lang="fr-FR" sz="2400" dirty="0"/>
             </a:br>
@@ -5392,10 +5305,6 @@
           <a:lstStyle/>
           <a:p>
             <a:pPr marL="12700" algn="ctr"/>
-            <a:r>
-              <a:rPr lang="fr-FR" sz="2400" dirty="0"/>
-              <a:t/>
-            </a:r>
             <a:br>
               <a:rPr lang="fr-FR" sz="2400" dirty="0"/>
             </a:br>
@@ -5736,10 +5645,6 @@
           <a:lstStyle/>
           <a:p>
             <a:pPr marL="12700" algn="ctr"/>
-            <a:r>
-              <a:rPr lang="fr-FR" sz="2400" dirty="0"/>
-              <a:t/>
-            </a:r>
             <a:br>
               <a:rPr lang="fr-FR" sz="2400" dirty="0"/>
             </a:br>
@@ -6955,10 +6860,6 @@
           <a:lstStyle/>
           <a:p>
             <a:pPr marL="12700" algn="ctr"/>
-            <a:r>
-              <a:rPr lang="fr-FR" sz="2400" dirty="0"/>
-              <a:t/>
-            </a:r>
             <a:br>
               <a:rPr lang="fr-FR" sz="2400" dirty="0"/>
             </a:br>
@@ -8385,10 +8286,6 @@
           <a:lstStyle/>
           <a:p>
             <a:pPr marL="12700" algn="ctr"/>
-            <a:r>
-              <a:rPr lang="fr-FR" sz="2400" dirty="0"/>
-              <a:t/>
-            </a:r>
             <a:br>
               <a:rPr lang="fr-FR" sz="2400" dirty="0"/>
             </a:br>
@@ -8818,10 +8715,6 @@
           <a:lstStyle/>
           <a:p>
             <a:pPr marL="12700" algn="ctr"/>
-            <a:r>
-              <a:rPr lang="fr-FR" sz="2400" dirty="0"/>
-              <a:t/>
-            </a:r>
             <a:br>
               <a:rPr lang="fr-FR" sz="2400" dirty="0"/>
             </a:br>
@@ -10024,10 +9917,6 @@
           <a:lstStyle/>
           <a:p>
             <a:pPr marL="12700" algn="ctr"/>
-            <a:r>
-              <a:rPr lang="fr-FR" sz="2400" dirty="0"/>
-              <a:t/>
-            </a:r>
             <a:br>
               <a:rPr lang="fr-FR" sz="2400" dirty="0"/>
             </a:br>
@@ -10129,14 +10018,6 @@
   <p:clrMapOvr>
     <a:masterClrMapping/>
   </p:clrMapOvr>
-  <mc:AlternateContent xmlns:mc="http://schemas.openxmlformats.org/markup-compatibility/2006" xmlns:p14="http://schemas.microsoft.com/office/powerpoint/2010/main">
-    <mc:Choice Requires="p14">
-      <p:transition spd="slow" p14:dur="2000"/>
-    </mc:Choice>
-    <mc:Fallback xmlns="">
-      <p:transition spd="slow"/>
-    </mc:Fallback>
-  </mc:AlternateContent>
 </p:sld>
 </file>
 
@@ -10263,10 +10144,6 @@
           <a:lstStyle/>
           <a:p>
             <a:pPr marL="12700" algn="ctr"/>
-            <a:r>
-              <a:rPr lang="fr-FR" sz="2400" dirty="0"/>
-              <a:t/>
-            </a:r>
             <a:br>
               <a:rPr lang="fr-FR" sz="2400" dirty="0"/>
             </a:br>
@@ -10507,10 +10384,6 @@
           <a:lstStyle/>
           <a:p>
             <a:pPr marL="12700" algn="ctr"/>
-            <a:r>
-              <a:rPr lang="fr-FR" sz="2400" dirty="0"/>
-              <a:t/>
-            </a:r>
             <a:br>
               <a:rPr lang="fr-FR" sz="2400" dirty="0"/>
             </a:br>
@@ -13017,23 +12890,6 @@
               <a:tabLst/>
               <a:defRPr/>
             </a:pPr>
-            <a:r>
-              <a:rPr kumimoji="0" lang="fr-FR" sz="2400" b="0" i="0" u="none" strike="noStrike" kern="1200" cap="none" spc="0" normalizeH="0" baseline="0" noProof="0" dirty="0">
-                <a:ln>
-                  <a:noFill/>
-                </a:ln>
-                <a:solidFill>
-                  <a:prstClr val="black"/>
-                </a:solidFill>
-                <a:effectLst/>
-                <a:uLnTx/>
-                <a:uFillTx/>
-                <a:latin typeface="Calibri" panose="020F0502020204030204"/>
-                <a:ea typeface="+mn-ea"/>
-                <a:cs typeface="+mn-cs"/>
-              </a:rPr>
-              <a:t/>
-            </a:r>
             <a:br>
               <a:rPr kumimoji="0" lang="fr-FR" sz="2400" b="0" i="0" u="none" strike="noStrike" kern="1200" cap="none" spc="0" normalizeH="0" baseline="0" noProof="0" dirty="0">
                 <a:ln>
@@ -14184,10 +14040,6 @@
           <a:lstStyle/>
           <a:p>
             <a:pPr marL="12700" algn="ctr"/>
-            <a:r>
-              <a:rPr lang="fr-FR" sz="2400" dirty="0"/>
-              <a:t/>
-            </a:r>
             <a:br>
               <a:rPr lang="fr-FR" sz="2400" dirty="0"/>
             </a:br>
@@ -15789,23 +15641,6 @@
               <a:tabLst/>
               <a:defRPr/>
             </a:pPr>
-            <a:r>
-              <a:rPr kumimoji="0" lang="fr-FR" sz="2400" b="0" i="0" u="none" strike="noStrike" kern="1200" cap="none" spc="0" normalizeH="0" baseline="0" noProof="0" dirty="0">
-                <a:ln>
-                  <a:noFill/>
-                </a:ln>
-                <a:solidFill>
-                  <a:prstClr val="black"/>
-                </a:solidFill>
-                <a:effectLst/>
-                <a:uLnTx/>
-                <a:uFillTx/>
-                <a:latin typeface="Calibri" panose="020F0502020204030204"/>
-                <a:ea typeface="+mn-ea"/>
-                <a:cs typeface="+mn-cs"/>
-              </a:rPr>
-              <a:t/>
-            </a:r>
             <a:br>
               <a:rPr kumimoji="0" lang="fr-FR" sz="2400" b="0" i="0" u="none" strike="noStrike" kern="1200" cap="none" spc="0" normalizeH="0" baseline="0" noProof="0" dirty="0">
                 <a:ln>
@@ -17763,10 +17598,6 @@
           <a:lstStyle/>
           <a:p>
             <a:pPr marL="12700" algn="ctr"/>
-            <a:r>
-              <a:rPr lang="fr-FR" sz="2400" dirty="0"/>
-              <a:t/>
-            </a:r>
             <a:br>
               <a:rPr lang="fr-FR" sz="2400" dirty="0"/>
             </a:br>
@@ -18475,10 +18306,6 @@
           <a:lstStyle/>
           <a:p>
             <a:pPr marL="12700" algn="ctr"/>
-            <a:r>
-              <a:rPr lang="fr-FR" sz="2400" dirty="0"/>
-              <a:t/>
-            </a:r>
             <a:br>
               <a:rPr lang="fr-FR" sz="2400" dirty="0"/>
             </a:br>
@@ -19659,10 +19486,6 @@
           <a:lstStyle/>
           <a:p>
             <a:pPr marL="12700" algn="ctr"/>
-            <a:r>
-              <a:rPr lang="fr-FR" sz="2400" dirty="0"/>
-              <a:t/>
-            </a:r>
             <a:br>
               <a:rPr lang="fr-FR" sz="2400" dirty="0"/>
             </a:br>
@@ -20266,10 +20089,6 @@
           <a:lstStyle/>
           <a:p>
             <a:pPr marL="12700" algn="ctr"/>
-            <a:r>
-              <a:rPr lang="fr-FR" sz="2400" dirty="0"/>
-              <a:t/>
-            </a:r>
             <a:br>
               <a:rPr lang="fr-FR" sz="2400" dirty="0"/>
             </a:br>
@@ -20687,10 +20506,6 @@
           <a:lstStyle/>
           <a:p>
             <a:pPr marL="12700" algn="ctr"/>
-            <a:r>
-              <a:rPr lang="fr-FR" sz="2400" dirty="0"/>
-              <a:t/>
-            </a:r>
             <a:br>
               <a:rPr lang="fr-FR" sz="2400" dirty="0"/>
             </a:br>
@@ -21333,10 +21148,6 @@
           <a:lstStyle/>
           <a:p>
             <a:pPr marL="12700" algn="ctr"/>
-            <a:r>
-              <a:rPr lang="fr-FR" sz="2400" dirty="0"/>
-              <a:t/>
-            </a:r>
             <a:br>
               <a:rPr lang="fr-FR" sz="2400" dirty="0"/>
             </a:br>
@@ -21775,10 +21586,6 @@
           <a:lstStyle/>
           <a:p>
             <a:pPr marL="12700" algn="ctr"/>
-            <a:r>
-              <a:rPr lang="fr-FR" sz="2400" dirty="0"/>
-              <a:t/>
-            </a:r>
             <a:br>
               <a:rPr lang="fr-FR" sz="2400" dirty="0"/>
             </a:br>
@@ -22281,10 +22088,6 @@
           <a:lstStyle/>
           <a:p>
             <a:pPr marL="12700" algn="ctr"/>
-            <a:r>
-              <a:rPr lang="fr-FR" sz="2400" dirty="0"/>
-              <a:t/>
-            </a:r>
             <a:br>
               <a:rPr lang="fr-FR" sz="2400" dirty="0"/>
             </a:br>
@@ -22868,10 +22671,6 @@
           <a:lstStyle/>
           <a:p>
             <a:pPr marL="12700" algn="ctr"/>
-            <a:r>
-              <a:rPr lang="fr-FR" sz="2400" dirty="0"/>
-              <a:t/>
-            </a:r>
             <a:br>
               <a:rPr lang="fr-FR" sz="2400" dirty="0"/>
             </a:br>
@@ -23587,10 +23386,6 @@
           <a:lstStyle/>
           <a:p>
             <a:pPr marL="12700" algn="ctr"/>
-            <a:r>
-              <a:rPr lang="fr-FR" sz="2400" dirty="0"/>
-              <a:t/>
-            </a:r>
             <a:br>
               <a:rPr lang="fr-FR" sz="2400" dirty="0"/>
             </a:br>
@@ -25749,10 +25544,6 @@
           <a:lstStyle/>
           <a:p>
             <a:pPr marL="12700" algn="ctr"/>
-            <a:r>
-              <a:rPr lang="fr-FR" sz="2400" dirty="0"/>
-              <a:t/>
-            </a:r>
             <a:br>
               <a:rPr lang="fr-FR" sz="2400" dirty="0"/>
             </a:br>
@@ -26132,7 +25923,7 @@
       </p:grpSpPr>
       <p:sp>
         <p:nvSpPr>
-          <p:cNvPr id="3" name="Titre 1"/>
+          <p:cNvPr id="7" name="Titre 1"/>
           <p:cNvSpPr txBox="1">
             <a:spLocks/>
           </p:cNvSpPr>
@@ -26140,8 +25931,8 @@
         </p:nvSpPr>
         <p:spPr>
           <a:xfrm>
-            <a:off x="1875087" y="426851"/>
-            <a:ext cx="9011012" cy="810950"/>
+            <a:off x="2025434" y="396969"/>
+            <a:ext cx="8440271" cy="810950"/>
           </a:xfrm>
           <a:prstGeom prst="rect">
             <a:avLst/>
@@ -26173,7 +25964,7 @@
           <a:p>
             <a:pPr algn="ctr"/>
             <a:r>
-              <a:rPr lang="fr-FR" sz="3800" dirty="0">
+              <a:rPr lang="en-US" sz="3800" dirty="0">
                 <a:solidFill>
                   <a:prstClr val="black">
                     <a:lumMod val="85000"/>
@@ -26183,7 +25974,7 @@
                 <a:latin typeface="Segoe UI" panose="020B0502040204020203" pitchFamily="34" charset="0"/>
                 <a:cs typeface="Segoe UI" panose="020B0502040204020203" pitchFamily="34" charset="0"/>
               </a:rPr>
-              <a:t>Access Permissions in SQLite</a:t>
+              <a:t>Security </a:t>
             </a:r>
             <a:endParaRPr lang="fr-FR" sz="3800" dirty="0">
               <a:solidFill>
@@ -26196,16 +25987,52 @@
           </a:p>
         </p:txBody>
       </p:sp>
-      <p:sp>
-        <p:nvSpPr>
-          <p:cNvPr id="9" name="TextBox 8"/>
+      <p:pic>
+        <p:nvPicPr>
+          <p:cNvPr id="3" name="Image 2">
+            <a:extLst>
+              <a:ext uri="{FF2B5EF4-FFF2-40B4-BE49-F238E27FC236}">
+                <a16:creationId xmlns:a16="http://schemas.microsoft.com/office/drawing/2014/main" id="{9CAC4143-6A75-46E9-B24A-D49612AD612E}"/>
+              </a:ext>
+            </a:extLst>
+          </p:cNvPr>
+          <p:cNvPicPr>
+            <a:picLocks noChangeAspect="1"/>
+          </p:cNvPicPr>
+          <p:nvPr/>
+        </p:nvPicPr>
+        <p:blipFill>
+          <a:blip r:embed="rId2"/>
+          <a:stretch>
+            <a:fillRect/>
+          </a:stretch>
+        </p:blipFill>
+        <p:spPr>
+          <a:xfrm>
+            <a:off x="201227" y="2406911"/>
+            <a:ext cx="11789546" cy="4191533"/>
+          </a:xfrm>
+          <a:prstGeom prst="rect">
+            <a:avLst/>
+          </a:prstGeom>
+        </p:spPr>
+      </p:pic>
+      <p:sp>
+        <p:nvSpPr>
+          <p:cNvPr id="4" name="ZoneTexte 3">
+            <a:extLst>
+              <a:ext uri="{FF2B5EF4-FFF2-40B4-BE49-F238E27FC236}">
+                <a16:creationId xmlns:a16="http://schemas.microsoft.com/office/drawing/2014/main" id="{075E5FD0-FD18-46F7-AAC2-9D6AF1135DC3}"/>
+              </a:ext>
+            </a:extLst>
+          </p:cNvPr>
           <p:cNvSpPr txBox="1"/>
           <p:nvPr/>
         </p:nvSpPr>
         <p:spPr>
           <a:xfrm>
-            <a:off x="507274" y="3475972"/>
-            <a:ext cx="10720603" cy="523220"/>
+            <a:off x="1887100" y="1407305"/>
+            <a:ext cx="8716938" cy="400110"/>
           </a:xfrm>
           <a:prstGeom prst="rect">
             <a:avLst/>
@@ -26213,164 +26040,351 @@
           <a:noFill/>
         </p:spPr>
         <p:txBody>
-          <a:bodyPr wrap="square" rtlCol="0">
-            <a:spAutoFit/>
-          </a:bodyPr>
-          <a:lstStyle/>
-          <a:p>
-            <a:pPr marL="457200" indent="-457200">
-              <a:buFont typeface="Arial" panose="020B0604020202020204" pitchFamily="34" charset="0"/>
-              <a:buChar char="•"/>
-            </a:pPr>
-            <a:endParaRPr lang="fr-FR" sz="2800" dirty="0">
-              <a:solidFill>
-                <a:srgbClr val="287C66"/>
-              </a:solidFill>
-            </a:endParaRPr>
-          </a:p>
-        </p:txBody>
-      </p:sp>
-      <p:sp>
-        <p:nvSpPr>
-          <p:cNvPr id="7" name="TextBox 6"/>
-          <p:cNvSpPr txBox="1"/>
-          <p:nvPr/>
-        </p:nvSpPr>
-        <p:spPr>
-          <a:xfrm>
-            <a:off x="670803" y="2224268"/>
-            <a:ext cx="10113987" cy="2031325"/>
-          </a:xfrm>
-          <a:prstGeom prst="rect">
-            <a:avLst/>
-          </a:prstGeom>
-          <a:noFill/>
-        </p:spPr>
-        <p:txBody>
           <a:bodyPr wrap="none" rtlCol="0">
             <a:spAutoFit/>
           </a:bodyPr>
           <a:lstStyle/>
           <a:p>
-            <a:pPr marL="914400" lvl="1" indent="-457200">
-              <a:lnSpc>
-                <a:spcPct val="150000"/>
-              </a:lnSpc>
-              <a:buFont typeface="Arial" panose="020B0604020202020204" pitchFamily="34" charset="0"/>
-              <a:buChar char="•"/>
-            </a:pPr>
-            <a:r>
-              <a:rPr lang="fr-FR" sz="2400" dirty="0" err="1"/>
-              <a:t>SQLite</a:t>
-            </a:r>
-            <a:r>
-              <a:rPr lang="fr-FR" sz="2400" dirty="0"/>
+            <a:r>
+              <a:rPr lang="fr-FR" sz="2000" dirty="0"/>
+              <a:t>This </a:t>
+            </a:r>
+            <a:r>
+              <a:rPr lang="fr-FR" sz="2000" dirty="0" err="1"/>
+              <a:t>is</a:t>
+            </a:r>
+            <a:r>
+              <a:rPr lang="fr-FR" sz="2000" dirty="0"/>
+              <a:t> an </a:t>
+            </a:r>
+            <a:r>
+              <a:rPr lang="fr-FR" sz="2000" dirty="0" err="1"/>
+              <a:t>example</a:t>
+            </a:r>
+            <a:r>
+              <a:rPr lang="fr-FR" sz="2000" dirty="0"/>
               <a:t> </a:t>
             </a:r>
             <a:r>
-              <a:rPr lang="fr-FR" sz="2400" dirty="0" err="1"/>
-              <a:t>does</a:t>
-            </a:r>
-            <a:r>
-              <a:rPr lang="fr-FR" sz="2400" dirty="0"/>
-              <a:t> not </a:t>
-            </a:r>
-            <a:r>
-              <a:rPr lang="fr-FR" sz="2400" dirty="0" err="1"/>
-              <a:t>provide</a:t>
-            </a:r>
-            <a:r>
-              <a:rPr lang="fr-FR" sz="2400" dirty="0"/>
-              <a:t> a control </a:t>
-            </a:r>
-            <a:r>
-              <a:rPr lang="fr-FR" sz="2400" dirty="0" err="1"/>
-              <a:t>mechanism</a:t>
-            </a:r>
-            <a:r>
-              <a:rPr lang="fr-FR" sz="2400" dirty="0"/>
+              <a:rPr lang="fr-FR" sz="2000" dirty="0" err="1"/>
+              <a:t>that</a:t>
+            </a:r>
+            <a:r>
+              <a:rPr lang="fr-FR" sz="2000" dirty="0"/>
+              <a:t> </a:t>
+            </a:r>
+            <a:r>
+              <a:rPr lang="fr-FR" sz="2000" dirty="0" err="1"/>
+              <a:t>we</a:t>
+            </a:r>
+            <a:r>
+              <a:rPr lang="fr-FR" sz="2000" dirty="0"/>
+              <a:t> </a:t>
+            </a:r>
+            <a:r>
+              <a:rPr lang="fr-FR" sz="2000" dirty="0" err="1"/>
+              <a:t>coded</a:t>
+            </a:r>
+            <a:r>
+              <a:rPr lang="fr-FR" sz="2000" dirty="0"/>
               <a:t> to </a:t>
             </a:r>
             <a:r>
-              <a:rPr lang="fr-FR" sz="2400" dirty="0" err="1"/>
-              <a:t>access</a:t>
-            </a:r>
-            <a:r>
-              <a:rPr lang="fr-FR" sz="2400" dirty="0"/>
-              <a:t> permissions</a:t>
-            </a:r>
-          </a:p>
-          <a:p>
-            <a:pPr marL="457200" indent="-457200">
-              <a:lnSpc>
-                <a:spcPct val="150000"/>
-              </a:lnSpc>
-              <a:buFont typeface="Arial" panose="020B0604020202020204" pitchFamily="34" charset="0"/>
-              <a:buChar char="•"/>
-            </a:pPr>
-            <a:endParaRPr lang="fr-FR" sz="2400" dirty="0"/>
-          </a:p>
-          <a:p>
-            <a:pPr marL="914400" lvl="1" indent="-457200">
-              <a:lnSpc>
-                <a:spcPct val="150000"/>
-              </a:lnSpc>
-              <a:buFont typeface="Arial" panose="020B0604020202020204" pitchFamily="34" charset="0"/>
-              <a:buChar char="•"/>
-            </a:pPr>
-            <a:r>
-              <a:rPr lang="fr-FR" sz="2400" dirty="0"/>
-              <a:t>The </a:t>
-            </a:r>
-            <a:r>
-              <a:rPr lang="fr-FR" sz="2400" dirty="0" err="1"/>
-              <a:t>only</a:t>
-            </a:r>
-            <a:r>
-              <a:rPr lang="fr-FR" sz="2400" dirty="0"/>
-              <a:t> Access Permission </a:t>
-            </a:r>
-            <a:r>
-              <a:rPr lang="fr-FR" sz="2400" dirty="0" err="1"/>
-              <a:t>is</a:t>
-            </a:r>
-            <a:r>
-              <a:rPr lang="fr-FR" sz="2400" dirty="0"/>
-              <a:t> the one </a:t>
-            </a:r>
-            <a:r>
-              <a:rPr lang="fr-FR" sz="2400" dirty="0" err="1"/>
-              <a:t>provided</a:t>
-            </a:r>
-            <a:r>
-              <a:rPr lang="fr-FR" sz="2400" dirty="0"/>
-              <a:t> by the Operating System</a:t>
-            </a:r>
-          </a:p>
-          <a:p>
-            <a:endParaRPr lang="en-US" sz="1600" dirty="0"/>
+              <a:rPr lang="fr-FR" sz="2000" dirty="0" err="1"/>
+              <a:t>encrypt</a:t>
+            </a:r>
+            <a:r>
+              <a:rPr lang="fr-FR" sz="2000" dirty="0"/>
+              <a:t> data </a:t>
+            </a:r>
+            <a:r>
+              <a:rPr lang="fr-FR" sz="2000" dirty="0" err="1"/>
+              <a:t>before</a:t>
+            </a:r>
+            <a:r>
+              <a:rPr lang="fr-FR" sz="2000" dirty="0"/>
+              <a:t> </a:t>
+            </a:r>
+            <a:r>
+              <a:rPr lang="fr-FR" sz="2000" dirty="0" err="1"/>
+              <a:t>Storing</a:t>
+            </a:r>
+            <a:r>
+              <a:rPr lang="fr-FR" sz="2000" dirty="0"/>
+              <a:t> </a:t>
+            </a:r>
+            <a:r>
+              <a:rPr lang="fr-FR" sz="2000" dirty="0" err="1"/>
+              <a:t>it</a:t>
+            </a:r>
+            <a:r>
+              <a:rPr lang="fr-FR" sz="2000" dirty="0"/>
+              <a:t> in the </a:t>
+            </a:r>
+            <a:r>
+              <a:rPr lang="fr-FR" sz="2000" dirty="0" err="1"/>
+              <a:t>DataBase</a:t>
+            </a:r>
+            <a:endParaRPr lang="fr-FR" sz="2000" dirty="0"/>
           </a:p>
         </p:txBody>
       </p:sp>
     </p:spTree>
     <p:extLst>
       <p:ext uri="{BB962C8B-B14F-4D97-AF65-F5344CB8AC3E}">
-        <p14:creationId xmlns:p14="http://schemas.microsoft.com/office/powerpoint/2010/main" val="1481813034"/>
+        <p14:creationId xmlns:p14="http://schemas.microsoft.com/office/powerpoint/2010/main" val="1382703198"/>
       </p:ext>
     </p:extLst>
   </p:cSld>
   <p:clrMapOvr>
     <a:masterClrMapping/>
   </p:clrMapOvr>
-  <mc:AlternateContent xmlns:mc="http://schemas.openxmlformats.org/markup-compatibility/2006" xmlns:p14="http://schemas.microsoft.com/office/powerpoint/2010/main">
-    <mc:Choice Requires="p14">
-      <p:transition spd="slow" p14:dur="1500">
-        <p:split orient="vert"/>
+  <mc:AlternateContent xmlns:mc="http://schemas.openxmlformats.org/markup-compatibility/2006">
+    <mc:Choice xmlns:p14="http://schemas.microsoft.com/office/powerpoint/2010/main" Requires="p14">
+      <p:transition spd="med" p14:dur="700">
+        <p:fade/>
       </p:transition>
     </mc:Choice>
-    <mc:Fallback xmlns="">
-      <p:transition spd="slow">
-        <p:split orient="vert"/>
+    <mc:Fallback>
+      <p:transition spd="med">
+        <p:fade/>
+      </p:transition>
+    </mc:Fallback>
+  </mc:AlternateContent>
+</p:sld>
+</file>
+
+<file path=ppt/slides/slide79.xml><?xml version="1.0" encoding="utf-8"?>
+<p:sld xmlns:a="http://schemas.openxmlformats.org/drawingml/2006/main" xmlns:r="http://schemas.openxmlformats.org/officeDocument/2006/relationships" xmlns:p="http://schemas.openxmlformats.org/presentationml/2006/main">
+  <p:cSld>
+    <p:bg>
+      <p:bgPr>
+        <a:solidFill>
+          <a:schemeClr val="bg2"/>
+        </a:solidFill>
+        <a:effectLst/>
+      </p:bgPr>
+    </p:bg>
+    <p:spTree>
+      <p:nvGrpSpPr>
+        <p:cNvPr id="1" name=""/>
+        <p:cNvGrpSpPr/>
+        <p:nvPr/>
+      </p:nvGrpSpPr>
+      <p:grpSpPr>
+        <a:xfrm>
+          <a:off x="0" y="0"/>
+          <a:ext cx="0" cy="0"/>
+          <a:chOff x="0" y="0"/>
+          <a:chExt cx="0" cy="0"/>
+        </a:xfrm>
+      </p:grpSpPr>
+      <p:sp>
+        <p:nvSpPr>
+          <p:cNvPr id="7" name="Titre 1"/>
+          <p:cNvSpPr txBox="1">
+            <a:spLocks/>
+          </p:cNvSpPr>
+          <p:nvPr/>
+        </p:nvSpPr>
+        <p:spPr>
+          <a:xfrm>
+            <a:off x="2025434" y="396969"/>
+            <a:ext cx="8440271" cy="810950"/>
+          </a:xfrm>
+          <a:prstGeom prst="rect">
+            <a:avLst/>
+          </a:prstGeom>
+        </p:spPr>
+        <p:txBody>
+          <a:bodyPr>
+            <a:normAutofit fontScale="97500"/>
+          </a:bodyPr>
+          <a:lstStyle>
+            <a:lvl1pPr algn="l" defTabSz="914400" rtl="0" eaLnBrk="1" latinLnBrk="0" hangingPunct="1">
+              <a:lnSpc>
+                <a:spcPct val="90000"/>
+              </a:lnSpc>
+              <a:spcBef>
+                <a:spcPct val="0"/>
+              </a:spcBef>
+              <a:buNone/>
+              <a:defRPr sz="4400" kern="1200">
+                <a:solidFill>
+                  <a:schemeClr val="tx1"/>
+                </a:solidFill>
+                <a:latin typeface="+mj-lt"/>
+                <a:ea typeface="+mj-ea"/>
+                <a:cs typeface="+mj-cs"/>
+              </a:defRPr>
+            </a:lvl1pPr>
+          </a:lstStyle>
+          <a:p>
+            <a:pPr algn="ctr"/>
+            <a:r>
+              <a:rPr lang="en-US" sz="3800" dirty="0">
+                <a:solidFill>
+                  <a:prstClr val="black">
+                    <a:lumMod val="85000"/>
+                    <a:lumOff val="15000"/>
+                  </a:prstClr>
+                </a:solidFill>
+                <a:latin typeface="Segoe UI" panose="020B0502040204020203" pitchFamily="34" charset="0"/>
+                <a:cs typeface="Segoe UI" panose="020B0502040204020203" pitchFamily="34" charset="0"/>
+              </a:rPr>
+              <a:t>Security </a:t>
+            </a:r>
+            <a:endParaRPr lang="fr-FR" sz="3800" dirty="0">
+              <a:solidFill>
+                <a:prstClr val="black">
+                  <a:lumMod val="85000"/>
+                  <a:lumOff val="15000"/>
+                </a:prstClr>
+              </a:solidFill>
+            </a:endParaRPr>
+          </a:p>
+        </p:txBody>
+      </p:sp>
+      <p:sp>
+        <p:nvSpPr>
+          <p:cNvPr id="4" name="ZoneTexte 3">
+            <a:extLst>
+              <a:ext uri="{FF2B5EF4-FFF2-40B4-BE49-F238E27FC236}">
+                <a16:creationId xmlns:a16="http://schemas.microsoft.com/office/drawing/2014/main" id="{075E5FD0-FD18-46F7-AAC2-9D6AF1135DC3}"/>
+              </a:ext>
+            </a:extLst>
+          </p:cNvPr>
+          <p:cNvSpPr txBox="1"/>
+          <p:nvPr/>
+        </p:nvSpPr>
+        <p:spPr>
+          <a:xfrm>
+            <a:off x="2248023" y="1305355"/>
+            <a:ext cx="8051563" cy="400110"/>
+          </a:xfrm>
+          <a:prstGeom prst="rect">
+            <a:avLst/>
+          </a:prstGeom>
+          <a:noFill/>
+        </p:spPr>
+        <p:txBody>
+          <a:bodyPr wrap="none" rtlCol="0">
+            <a:spAutoFit/>
+          </a:bodyPr>
+          <a:lstStyle/>
+          <a:p>
+            <a:r>
+              <a:rPr lang="fr-FR" sz="2000" dirty="0"/>
+              <a:t>This </a:t>
+            </a:r>
+            <a:r>
+              <a:rPr lang="fr-FR" sz="2000" dirty="0" err="1"/>
+              <a:t>is</a:t>
+            </a:r>
+            <a:r>
+              <a:rPr lang="fr-FR" sz="2000" dirty="0"/>
+              <a:t> the class </a:t>
+            </a:r>
+            <a:r>
+              <a:rPr lang="fr-FR" sz="2000" dirty="0" err="1"/>
+              <a:t>we</a:t>
+            </a:r>
+            <a:r>
+              <a:rPr lang="fr-FR" sz="2000" dirty="0"/>
+              <a:t> </a:t>
+            </a:r>
+            <a:r>
+              <a:rPr lang="fr-FR" sz="2000" dirty="0" err="1"/>
+              <a:t>coded</a:t>
+            </a:r>
+            <a:r>
+              <a:rPr lang="fr-FR" sz="2000" dirty="0"/>
+              <a:t> in Java, </a:t>
+            </a:r>
+            <a:r>
+              <a:rPr lang="fr-FR" sz="2000" dirty="0" err="1"/>
+              <a:t>We</a:t>
+            </a:r>
+            <a:r>
+              <a:rPr lang="fr-FR" sz="2000" dirty="0"/>
+              <a:t> </a:t>
+            </a:r>
+            <a:r>
+              <a:rPr lang="fr-FR" sz="2000" dirty="0" err="1"/>
+              <a:t>used</a:t>
+            </a:r>
+            <a:r>
+              <a:rPr lang="fr-FR" sz="2000" dirty="0"/>
+              <a:t> AES </a:t>
+            </a:r>
+            <a:r>
+              <a:rPr lang="fr-FR" sz="2000" dirty="0" err="1"/>
+              <a:t>Encryption</a:t>
+            </a:r>
+            <a:r>
+              <a:rPr lang="fr-FR" sz="2000" dirty="0"/>
+              <a:t> </a:t>
+            </a:r>
+            <a:r>
+              <a:rPr lang="fr-FR" sz="2000" dirty="0" err="1"/>
+              <a:t>with</a:t>
+            </a:r>
+            <a:r>
+              <a:rPr lang="fr-FR" sz="2000" dirty="0"/>
+              <a:t> 16byte keys</a:t>
+            </a:r>
+          </a:p>
+        </p:txBody>
+      </p:sp>
+      <p:pic>
+        <p:nvPicPr>
+          <p:cNvPr id="5" name="Image 4">
+            <a:extLst>
+              <a:ext uri="{FF2B5EF4-FFF2-40B4-BE49-F238E27FC236}">
+                <a16:creationId xmlns:a16="http://schemas.microsoft.com/office/drawing/2014/main" id="{1CC8A835-60C8-46E3-B642-6ACB37D260AF}"/>
+              </a:ext>
+            </a:extLst>
+          </p:cNvPr>
+          <p:cNvPicPr>
+            <a:picLocks noChangeAspect="1"/>
+          </p:cNvPicPr>
+          <p:nvPr/>
+        </p:nvPicPr>
+        <p:blipFill>
+          <a:blip r:embed="rId2"/>
+          <a:stretch>
+            <a:fillRect/>
+          </a:stretch>
+        </p:blipFill>
+        <p:spPr>
+          <a:xfrm>
+            <a:off x="2025434" y="2203012"/>
+            <a:ext cx="7751347" cy="4320852"/>
+          </a:xfrm>
+          <a:prstGeom prst="rect">
+            <a:avLst/>
+          </a:prstGeom>
+        </p:spPr>
+      </p:pic>
+    </p:spTree>
+    <p:extLst>
+      <p:ext uri="{BB962C8B-B14F-4D97-AF65-F5344CB8AC3E}">
+        <p14:creationId xmlns:p14="http://schemas.microsoft.com/office/powerpoint/2010/main" val="382352930"/>
+      </p:ext>
+    </p:extLst>
+  </p:cSld>
+  <p:clrMapOvr>
+    <a:masterClrMapping/>
+  </p:clrMapOvr>
+  <mc:AlternateContent xmlns:mc="http://schemas.openxmlformats.org/markup-compatibility/2006">
+    <mc:Choice xmlns:p14="http://schemas.microsoft.com/office/powerpoint/2010/main" Requires="p14">
+      <p:transition spd="med" p14:dur="700">
+        <p:fade/>
+      </p:transition>
+    </mc:Choice>
+    <mc:Fallback>
+      <p:transition spd="med">
+        <p:fade/>
       </p:transition>
     </mc:Fallback>
   </mc:AlternateContent>
@@ -26661,7 +26675,7 @@
               <a:t>Does not reproduce the usual client-server scheme but is directly integrated into programs</a:t>
             </a:r>
             <a:r>
-              <a:rPr kumimoji="0" lang="en-US" sz="2200" b="0" i="0" u="none" strike="noStrike" kern="1200" cap="none" spc="0" normalizeH="0" baseline="0" noProof="0" dirty="0" smtClean="0">
+              <a:rPr kumimoji="0" lang="en-US" sz="2200" b="0" i="0" u="none" strike="noStrike" kern="1200" cap="none" spc="0" normalizeH="0" baseline="0" noProof="0" dirty="0">
                 <a:ln>
                   <a:noFill/>
                 </a:ln>
@@ -26733,6 +26747,278 @@
   <p:clrMapOvr>
     <a:masterClrMapping/>
   </p:clrMapOvr>
+</p:sld>
+</file>
+
+<file path=ppt/slides/slide80.xml><?xml version="1.0" encoding="utf-8"?>
+<p:sld xmlns:a="http://schemas.openxmlformats.org/drawingml/2006/main" xmlns:r="http://schemas.openxmlformats.org/officeDocument/2006/relationships" xmlns:p="http://schemas.openxmlformats.org/presentationml/2006/main">
+  <p:cSld>
+    <p:bg>
+      <p:bgPr>
+        <a:solidFill>
+          <a:schemeClr val="bg2"/>
+        </a:solidFill>
+        <a:effectLst/>
+      </p:bgPr>
+    </p:bg>
+    <p:spTree>
+      <p:nvGrpSpPr>
+        <p:cNvPr id="1" name=""/>
+        <p:cNvGrpSpPr/>
+        <p:nvPr/>
+      </p:nvGrpSpPr>
+      <p:grpSpPr>
+        <a:xfrm>
+          <a:off x="0" y="0"/>
+          <a:ext cx="0" cy="0"/>
+          <a:chOff x="0" y="0"/>
+          <a:chExt cx="0" cy="0"/>
+        </a:xfrm>
+      </p:grpSpPr>
+      <p:sp>
+        <p:nvSpPr>
+          <p:cNvPr id="3" name="Titre 1"/>
+          <p:cNvSpPr txBox="1">
+            <a:spLocks/>
+          </p:cNvSpPr>
+          <p:nvPr/>
+        </p:nvSpPr>
+        <p:spPr>
+          <a:xfrm>
+            <a:off x="1875087" y="426851"/>
+            <a:ext cx="9011012" cy="810950"/>
+          </a:xfrm>
+          <a:prstGeom prst="rect">
+            <a:avLst/>
+          </a:prstGeom>
+        </p:spPr>
+        <p:txBody>
+          <a:bodyPr>
+            <a:normAutofit fontScale="97500"/>
+          </a:bodyPr>
+          <a:lstStyle>
+            <a:lvl1pPr algn="l" defTabSz="914400" rtl="0" eaLnBrk="1" latinLnBrk="0" hangingPunct="1">
+              <a:lnSpc>
+                <a:spcPct val="90000"/>
+              </a:lnSpc>
+              <a:spcBef>
+                <a:spcPct val="0"/>
+              </a:spcBef>
+              <a:buNone/>
+              <a:defRPr sz="4400" kern="1200">
+                <a:solidFill>
+                  <a:schemeClr val="tx1"/>
+                </a:solidFill>
+                <a:latin typeface="+mj-lt"/>
+                <a:ea typeface="+mj-ea"/>
+                <a:cs typeface="+mj-cs"/>
+              </a:defRPr>
+            </a:lvl1pPr>
+          </a:lstStyle>
+          <a:p>
+            <a:pPr algn="ctr"/>
+            <a:r>
+              <a:rPr lang="fr-FR" sz="3800" dirty="0">
+                <a:solidFill>
+                  <a:prstClr val="black">
+                    <a:lumMod val="85000"/>
+                    <a:lumOff val="15000"/>
+                  </a:prstClr>
+                </a:solidFill>
+                <a:latin typeface="Segoe UI" panose="020B0502040204020203" pitchFamily="34" charset="0"/>
+                <a:cs typeface="Segoe UI" panose="020B0502040204020203" pitchFamily="34" charset="0"/>
+              </a:rPr>
+              <a:t>Access Permissions in SQLite</a:t>
+            </a:r>
+            <a:endParaRPr lang="fr-FR" sz="3800" dirty="0">
+              <a:solidFill>
+                <a:prstClr val="black">
+                  <a:lumMod val="85000"/>
+                  <a:lumOff val="15000"/>
+                </a:prstClr>
+              </a:solidFill>
+            </a:endParaRPr>
+          </a:p>
+        </p:txBody>
+      </p:sp>
+      <p:sp>
+        <p:nvSpPr>
+          <p:cNvPr id="9" name="TextBox 8"/>
+          <p:cNvSpPr txBox="1"/>
+          <p:nvPr/>
+        </p:nvSpPr>
+        <p:spPr>
+          <a:xfrm>
+            <a:off x="507274" y="3475972"/>
+            <a:ext cx="10720603" cy="523220"/>
+          </a:xfrm>
+          <a:prstGeom prst="rect">
+            <a:avLst/>
+          </a:prstGeom>
+          <a:noFill/>
+        </p:spPr>
+        <p:txBody>
+          <a:bodyPr wrap="square" rtlCol="0">
+            <a:spAutoFit/>
+          </a:bodyPr>
+          <a:lstStyle/>
+          <a:p>
+            <a:pPr marL="457200" indent="-457200">
+              <a:buFont typeface="Arial" panose="020B0604020202020204" pitchFamily="34" charset="0"/>
+              <a:buChar char="•"/>
+            </a:pPr>
+            <a:endParaRPr lang="fr-FR" sz="2800" dirty="0">
+              <a:solidFill>
+                <a:srgbClr val="287C66"/>
+              </a:solidFill>
+            </a:endParaRPr>
+          </a:p>
+        </p:txBody>
+      </p:sp>
+      <p:sp>
+        <p:nvSpPr>
+          <p:cNvPr id="7" name="TextBox 6"/>
+          <p:cNvSpPr txBox="1"/>
+          <p:nvPr/>
+        </p:nvSpPr>
+        <p:spPr>
+          <a:xfrm>
+            <a:off x="670803" y="2224268"/>
+            <a:ext cx="10113987" cy="2031325"/>
+          </a:xfrm>
+          <a:prstGeom prst="rect">
+            <a:avLst/>
+          </a:prstGeom>
+          <a:noFill/>
+        </p:spPr>
+        <p:txBody>
+          <a:bodyPr wrap="none" rtlCol="0">
+            <a:spAutoFit/>
+          </a:bodyPr>
+          <a:lstStyle/>
+          <a:p>
+            <a:pPr marL="914400" lvl="1" indent="-457200">
+              <a:lnSpc>
+                <a:spcPct val="150000"/>
+              </a:lnSpc>
+              <a:buFont typeface="Arial" panose="020B0604020202020204" pitchFamily="34" charset="0"/>
+              <a:buChar char="•"/>
+            </a:pPr>
+            <a:r>
+              <a:rPr lang="fr-FR" sz="2400" dirty="0" err="1"/>
+              <a:t>SQLite</a:t>
+            </a:r>
+            <a:r>
+              <a:rPr lang="fr-FR" sz="2400" dirty="0"/>
+              <a:t> </a:t>
+            </a:r>
+            <a:r>
+              <a:rPr lang="fr-FR" sz="2400" dirty="0" err="1"/>
+              <a:t>does</a:t>
+            </a:r>
+            <a:r>
+              <a:rPr lang="fr-FR" sz="2400" dirty="0"/>
+              <a:t> not </a:t>
+            </a:r>
+            <a:r>
+              <a:rPr lang="fr-FR" sz="2400" dirty="0" err="1"/>
+              <a:t>provide</a:t>
+            </a:r>
+            <a:r>
+              <a:rPr lang="fr-FR" sz="2400" dirty="0"/>
+              <a:t> a control </a:t>
+            </a:r>
+            <a:r>
+              <a:rPr lang="fr-FR" sz="2400" dirty="0" err="1"/>
+              <a:t>mechanism</a:t>
+            </a:r>
+            <a:r>
+              <a:rPr lang="fr-FR" sz="2400" dirty="0"/>
+              <a:t> to </a:t>
+            </a:r>
+            <a:r>
+              <a:rPr lang="fr-FR" sz="2400" dirty="0" err="1"/>
+              <a:t>access</a:t>
+            </a:r>
+            <a:r>
+              <a:rPr lang="fr-FR" sz="2400" dirty="0"/>
+              <a:t> permissions</a:t>
+            </a:r>
+          </a:p>
+          <a:p>
+            <a:pPr marL="457200" indent="-457200">
+              <a:lnSpc>
+                <a:spcPct val="150000"/>
+              </a:lnSpc>
+              <a:buFont typeface="Arial" panose="020B0604020202020204" pitchFamily="34" charset="0"/>
+              <a:buChar char="•"/>
+            </a:pPr>
+            <a:endParaRPr lang="fr-FR" sz="2400" dirty="0"/>
+          </a:p>
+          <a:p>
+            <a:pPr marL="914400" lvl="1" indent="-457200">
+              <a:lnSpc>
+                <a:spcPct val="150000"/>
+              </a:lnSpc>
+              <a:buFont typeface="Arial" panose="020B0604020202020204" pitchFamily="34" charset="0"/>
+              <a:buChar char="•"/>
+            </a:pPr>
+            <a:r>
+              <a:rPr lang="fr-FR" sz="2400" dirty="0"/>
+              <a:t>The </a:t>
+            </a:r>
+            <a:r>
+              <a:rPr lang="fr-FR" sz="2400" dirty="0" err="1"/>
+              <a:t>only</a:t>
+            </a:r>
+            <a:r>
+              <a:rPr lang="fr-FR" sz="2400" dirty="0"/>
+              <a:t> Access Permission </a:t>
+            </a:r>
+            <a:r>
+              <a:rPr lang="fr-FR" sz="2400" dirty="0" err="1"/>
+              <a:t>is</a:t>
+            </a:r>
+            <a:r>
+              <a:rPr lang="fr-FR" sz="2400" dirty="0"/>
+              <a:t> the one </a:t>
+            </a:r>
+            <a:r>
+              <a:rPr lang="fr-FR" sz="2400" dirty="0" err="1"/>
+              <a:t>provided</a:t>
+            </a:r>
+            <a:r>
+              <a:rPr lang="fr-FR" sz="2400" dirty="0"/>
+              <a:t> by the Operating System</a:t>
+            </a:r>
+          </a:p>
+          <a:p>
+            <a:endParaRPr lang="en-US" sz="1600" dirty="0"/>
+          </a:p>
+        </p:txBody>
+      </p:sp>
+    </p:spTree>
+    <p:extLst>
+      <p:ext uri="{BB962C8B-B14F-4D97-AF65-F5344CB8AC3E}">
+        <p14:creationId xmlns:p14="http://schemas.microsoft.com/office/powerpoint/2010/main" val="1481813034"/>
+      </p:ext>
+    </p:extLst>
+  </p:cSld>
+  <p:clrMapOvr>
+    <a:masterClrMapping/>
+  </p:clrMapOvr>
+  <mc:AlternateContent xmlns:mc="http://schemas.openxmlformats.org/markup-compatibility/2006" xmlns:p14="http://schemas.microsoft.com/office/powerpoint/2010/main">
+    <mc:Choice Requires="p14">
+      <p:transition spd="slow" p14:dur="1500">
+        <p:split orient="vert"/>
+      </p:transition>
+    </mc:Choice>
+    <mc:Fallback xmlns="">
+      <p:transition spd="slow">
+        <p:split orient="vert"/>
+      </p:transition>
+    </mc:Fallback>
+  </mc:AlternateContent>
 </p:sld>
 </file>
 
@@ -26910,23 +27196,6 @@
               <a:tabLst/>
               <a:defRPr/>
             </a:pPr>
-            <a:r>
-              <a:rPr kumimoji="0" lang="fr-FR" sz="2400" b="0" i="0" u="none" strike="noStrike" kern="1200" cap="none" spc="0" normalizeH="0" baseline="0" noProof="0" dirty="0">
-                <a:ln>
-                  <a:noFill/>
-                </a:ln>
-                <a:solidFill>
-                  <a:prstClr val="black"/>
-                </a:solidFill>
-                <a:effectLst/>
-                <a:uLnTx/>
-                <a:uFillTx/>
-                <a:latin typeface="Calibri" panose="020F0502020204030204"/>
-                <a:ea typeface="+mn-ea"/>
-                <a:cs typeface="+mn-cs"/>
-              </a:rPr>
-              <a:t/>
-            </a:r>
             <a:br>
               <a:rPr kumimoji="0" lang="fr-FR" sz="2400" b="0" i="0" u="none" strike="noStrike" kern="1200" cap="none" spc="0" normalizeH="0" baseline="0" noProof="0" dirty="0">
                 <a:ln>

</xml_diff>